<commit_message>
added ditionaries/might be broken
</commit_message>
<xml_diff>
--- a/output/fomc_template_mod.pptx
+++ b/output/fomc_template_mod.pptx
@@ -213,10 +213,10 @@
           </c:spPr>
           <c:cat>
             <c:numRef>
-              <c:f>Sheet1!$A$2:$A$278</c:f>
+              <c:f>Sheet1!$A$2:$A$279</c:f>
               <c:numCache>
                 <c:formatCode>yyyy\-mm\-dd</c:formatCode>
-                <c:ptCount val="277"/>
+                <c:ptCount val="278"/>
                 <c:pt idx="0">
                   <c:v>34700.0</c:v>
                 </c:pt>
@@ -1047,16 +1047,19 @@
                 </c:pt>
                 <c:pt idx="276">
                   <c:v>43101.0</c:v>
+                </c:pt>
+                <c:pt idx="277">
+                  <c:v>43132.0</c:v>
                 </c:pt>
               </c:numCache>
             </c:numRef>
           </c:cat>
           <c:val>
             <c:numRef>
-              <c:f>Sheet1!$B$2:$B$278</c:f>
+              <c:f>Sheet1!$B$2:$B$279</c:f>
               <c:numCache>
                 <c:formatCode>General</c:formatCode>
-                <c:ptCount val="277"/>
+                <c:ptCount val="278"/>
                 <c:pt idx="0">
                   <c:v>-1.0</c:v>
                 </c:pt>
@@ -1886,6 +1889,9 @@
                   <c:v>-1.0</c:v>
                 </c:pt>
                 <c:pt idx="276">
+                  <c:v>-1.0</c:v>
+                </c:pt>
+                <c:pt idx="277">
                   <c:v>-1.0</c:v>
                 </c:pt>
               </c:numCache>
@@ -5297,7 +5303,7 @@
                   <c:v>123.1</c:v>
                 </c:pt>
                 <c:pt idx="276">
-                  <c:v>125.4</c:v>
+                  <c:v>124.3</c:v>
                 </c:pt>
               </c:numCache>
             </c:numRef>
@@ -5341,13 +5347,7 @@
         </c:scaling>
         <c:delete val="0"/>
         <c:axPos val="l"/>
-        <c:majorGridlines>
-          <c:spPr>
-            <a:ln>
-              <a:prstDash val="lgDash"/>
-            </a:ln>
-          </c:spPr>
-        </c:majorGridlines>
+        <c:majorGridlines/>
         <c:numFmt formatCode="General" sourceLinked="1"/>
         <c:majorTickMark val="out"/>
         <c:minorTickMark val="none"/>

</xml_diff>